<commit_message>
added link to ERCEA report slide 19
</commit_message>
<xml_diff>
--- a/instructors/13-Repositories_v3.1.pptx
+++ b/instructors/13-Repositories_v3.1.pptx
@@ -223,7 +223,7 @@
           <a:p>
             <a:fld id="{585C48AE-4A1E-9A43-835F-510354165F99}" type="datetimeFigureOut">
               <a:rPr lang="en-GB" smtClean="0"/>
-              <a:t>24/03/2023</a:t>
+              <a:t>30/03/2023</a:t>
             </a:fld>
             <a:endParaRPr lang="en-GB"/>
           </a:p>
@@ -1080,7 +1080,7 @@
           <a:p>
             <a:fld id="{5913FB77-D8DB-4AB9-8EA5-EE8C3B57A5E1}" type="datetimeFigureOut">
               <a:rPr lang="en-GB" smtClean="0"/>
-              <a:t>24/03/2023</a:t>
+              <a:t>30/03/2023</a:t>
             </a:fld>
             <a:endParaRPr lang="en-GB"/>
           </a:p>
@@ -1327,7 +1327,7 @@
           <a:p>
             <a:fld id="{5913FB77-D8DB-4AB9-8EA5-EE8C3B57A5E1}" type="datetimeFigureOut">
               <a:rPr lang="en-GB" smtClean="0"/>
-              <a:t>24/03/2023</a:t>
+              <a:t>30/03/2023</a:t>
             </a:fld>
             <a:endParaRPr lang="en-GB"/>
           </a:p>
@@ -1537,7 +1537,7 @@
           <a:p>
             <a:fld id="{5913FB77-D8DB-4AB9-8EA5-EE8C3B57A5E1}" type="datetimeFigureOut">
               <a:rPr lang="en-GB" smtClean="0"/>
-              <a:t>24/03/2023</a:t>
+              <a:t>30/03/2023</a:t>
             </a:fld>
             <a:endParaRPr lang="en-GB"/>
           </a:p>
@@ -1737,7 +1737,7 @@
           <a:p>
             <a:fld id="{5913FB77-D8DB-4AB9-8EA5-EE8C3B57A5E1}" type="datetimeFigureOut">
               <a:rPr lang="en-GB" smtClean="0"/>
-              <a:t>24/03/2023</a:t>
+              <a:t>30/03/2023</a:t>
             </a:fld>
             <a:endParaRPr lang="en-GB"/>
           </a:p>
@@ -2013,7 +2013,7 @@
           <a:p>
             <a:fld id="{5913FB77-D8DB-4AB9-8EA5-EE8C3B57A5E1}" type="datetimeFigureOut">
               <a:rPr lang="en-GB" smtClean="0"/>
-              <a:t>24/03/2023</a:t>
+              <a:t>30/03/2023</a:t>
             </a:fld>
             <a:endParaRPr lang="en-GB"/>
           </a:p>
@@ -2281,7 +2281,7 @@
           <a:p>
             <a:fld id="{5913FB77-D8DB-4AB9-8EA5-EE8C3B57A5E1}" type="datetimeFigureOut">
               <a:rPr lang="en-GB" smtClean="0"/>
-              <a:t>24/03/2023</a:t>
+              <a:t>30/03/2023</a:t>
             </a:fld>
             <a:endParaRPr lang="en-GB"/>
           </a:p>
@@ -2696,7 +2696,7 @@
           <a:p>
             <a:fld id="{5913FB77-D8DB-4AB9-8EA5-EE8C3B57A5E1}" type="datetimeFigureOut">
               <a:rPr lang="en-GB" smtClean="0"/>
-              <a:t>24/03/2023</a:t>
+              <a:t>30/03/2023</a:t>
             </a:fld>
             <a:endParaRPr lang="en-GB"/>
           </a:p>
@@ -2838,7 +2838,7 @@
           <a:p>
             <a:fld id="{5913FB77-D8DB-4AB9-8EA5-EE8C3B57A5E1}" type="datetimeFigureOut">
               <a:rPr lang="en-GB" smtClean="0"/>
-              <a:t>24/03/2023</a:t>
+              <a:t>30/03/2023</a:t>
             </a:fld>
             <a:endParaRPr lang="en-GB"/>
           </a:p>
@@ -2951,7 +2951,7 @@
           <a:p>
             <a:fld id="{5913FB77-D8DB-4AB9-8EA5-EE8C3B57A5E1}" type="datetimeFigureOut">
               <a:rPr lang="en-GB" smtClean="0"/>
-              <a:t>24/03/2023</a:t>
+              <a:t>30/03/2023</a:t>
             </a:fld>
             <a:endParaRPr lang="en-GB"/>
           </a:p>
@@ -3264,7 +3264,7 @@
           <a:p>
             <a:fld id="{5913FB77-D8DB-4AB9-8EA5-EE8C3B57A5E1}" type="datetimeFigureOut">
               <a:rPr lang="en-GB" smtClean="0"/>
-              <a:t>24/03/2023</a:t>
+              <a:t>30/03/2023</a:t>
             </a:fld>
             <a:endParaRPr lang="en-GB"/>
           </a:p>
@@ -3553,7 +3553,7 @@
           <a:p>
             <a:fld id="{5913FB77-D8DB-4AB9-8EA5-EE8C3B57A5E1}" type="datetimeFigureOut">
               <a:rPr lang="en-GB" smtClean="0"/>
-              <a:t>24/03/2023</a:t>
+              <a:t>30/03/2023</a:t>
             </a:fld>
             <a:endParaRPr lang="en-GB"/>
           </a:p>
@@ -3795,7 +3795,7 @@
             <a:fld id="{5913FB77-D8DB-4AB9-8EA5-EE8C3B57A5E1}" type="datetimeFigureOut">
               <a:rPr lang="en-GB" smtClean="0"/>
               <a:pPr/>
-              <a:t>24/03/2023</a:t>
+              <a:t>30/03/2023</a:t>
             </a:fld>
             <a:endParaRPr lang="en-GB"/>
           </a:p>
@@ -4399,6 +4399,13 @@
   <p:clrMapOvr>
     <a:masterClrMapping/>
   </p:clrMapOvr>
+  <p:timing>
+    <p:tnLst>
+      <p:par>
+        <p:cTn id="1" dur="indefinite" restart="never" nodeType="tmRoot"/>
+      </p:par>
+    </p:tnLst>
+  </p:timing>
 </p:sld>
 </file>
 
@@ -6423,7 +6430,7 @@
         <p:spPr>
           <a:xfrm>
             <a:off x="742384" y="2064189"/>
-            <a:ext cx="10981854" cy="3416320"/>
+            <a:ext cx="10981854" cy="3785652"/>
           </a:xfrm>
           <a:prstGeom prst="rect">
             <a:avLst/>
@@ -6436,12 +6443,20 @@
           <a:lstStyle/>
           <a:p>
             <a:r>
-              <a:rPr lang="pl-PL" sz="2400" dirty="0" err="1">
-                <a:solidFill>
-                  <a:srgbClr val="0070C0"/>
-                </a:solidFill>
-              </a:rPr>
-              <a:t>FAIRSharing.org</a:t>
+              <a:rPr lang="en-GB" sz="2400" dirty="0" smtClean="0">
+                <a:solidFill>
+                  <a:srgbClr val="0070C0"/>
+                </a:solidFill>
+              </a:rPr>
+              <a:t>-</a:t>
+            </a:r>
+            <a:r>
+              <a:rPr lang="pl-PL" sz="2400" dirty="0" smtClean="0">
+                <a:solidFill>
+                  <a:srgbClr val="0070C0"/>
+                </a:solidFill>
+              </a:rPr>
+              <a:t>FAIRSharing.org </a:t>
             </a:r>
             <a:r>
               <a:rPr lang="pl-PL" sz="2400" dirty="0">
@@ -6449,7 +6464,7 @@
                   <a:srgbClr val="0070C0"/>
                 </a:solidFill>
               </a:rPr>
-              <a:t> – search engine</a:t>
+              <a:t>– search engine</a:t>
             </a:r>
           </a:p>
           <a:p>
@@ -6460,25 +6475,23 @@
             </a:endParaRPr>
           </a:p>
           <a:p>
+            <a:pPr marL="342900" indent="-342900">
+              <a:buFont typeface="Arial" panose="020B0604020202020204" pitchFamily="34" charset="0"/>
+              <a:buChar char="•"/>
+            </a:pPr>
+            <a:r>
+              <a:rPr lang="pl-PL" sz="2400" dirty="0" smtClean="0">
+                <a:solidFill>
+                  <a:srgbClr val="0070C0"/>
+                </a:solidFill>
+              </a:rPr>
+              <a:t>Repositories</a:t>
+            </a:r>
             <a:endParaRPr lang="pl-PL" sz="2400" dirty="0">
               <a:solidFill>
                 <a:srgbClr val="0070C0"/>
               </a:solidFill>
             </a:endParaRPr>
-          </a:p>
-          <a:p>
-            <a:pPr marL="342900" indent="-342900">
-              <a:buFont typeface="Arial" panose="020B0604020202020204" pitchFamily="34" charset="0"/>
-              <a:buChar char="•"/>
-            </a:pPr>
-            <a:r>
-              <a:rPr lang="pl-PL" sz="2400" dirty="0">
-                <a:solidFill>
-                  <a:srgbClr val="0070C0"/>
-                </a:solidFill>
-              </a:rPr>
-              <a:t>Repositories</a:t>
-            </a:r>
           </a:p>
           <a:p>
             <a:pPr marL="342900" indent="-342900">
@@ -6520,26 +6533,73 @@
             </a:endParaRPr>
           </a:p>
           <a:p>
-            <a:pPr marL="285750" indent="-285750">
-              <a:buFontTx/>
-              <a:buChar char="-"/>
-            </a:pPr>
-            <a:endParaRPr lang="pl-PL" sz="2400" dirty="0">
+            <a:r>
+              <a:rPr lang="pl-PL" sz="2400" dirty="0" smtClean="0">
+                <a:solidFill>
+                  <a:srgbClr val="0070C0"/>
+                </a:solidFill>
+              </a:rPr>
+              <a:t>(</a:t>
+            </a:r>
+            <a:r>
+              <a:rPr lang="pl-PL" sz="2400" dirty="0">
+                <a:solidFill>
+                  <a:srgbClr val="0070C0"/>
+                </a:solidFill>
+              </a:rPr>
+              <a:t>too) many options for each </a:t>
+            </a:r>
+            <a:r>
+              <a:rPr lang="pl-PL" sz="2400" dirty="0" smtClean="0">
+                <a:solidFill>
+                  <a:srgbClr val="0070C0"/>
+                </a:solidFill>
+              </a:rPr>
+              <a:t>type</a:t>
+            </a:r>
+            <a:endParaRPr lang="en-GB" sz="2400" dirty="0" smtClean="0">
               <a:solidFill>
                 <a:srgbClr val="0070C0"/>
               </a:solidFill>
             </a:endParaRPr>
           </a:p>
           <a:p>
-            <a:r>
-              <a:rPr lang="pl-PL" sz="2400" dirty="0">
-                <a:solidFill>
-                  <a:srgbClr val="0070C0"/>
-                </a:solidFill>
-              </a:rPr>
-              <a:t>(too) many options for each type</a:t>
-            </a:r>
-            <a:endParaRPr lang="en-GB" sz="2400" dirty="0" err="1">
+            <a:endParaRPr lang="en-GB" sz="2400" dirty="0">
+              <a:solidFill>
+                <a:srgbClr val="0070C0"/>
+              </a:solidFill>
+            </a:endParaRPr>
+          </a:p>
+          <a:p>
+            <a:r>
+              <a:rPr lang="en-GB" sz="2400" dirty="0" smtClean="0">
+                <a:solidFill>
+                  <a:srgbClr val="0070C0"/>
+                </a:solidFill>
+              </a:rPr>
+              <a:t>-Inventory of identified trusted repositories (ERCEA)</a:t>
+            </a:r>
+          </a:p>
+          <a:p>
+            <a:r>
+              <a:rPr lang="en-GB" sz="2400" dirty="0" smtClean="0">
+                <a:solidFill>
+                  <a:srgbClr val="0070C0"/>
+                </a:solidFill>
+                <a:hlinkClick r:id="rId2"/>
+              </a:rPr>
+              <a:t>https</a:t>
+            </a:r>
+            <a:r>
+              <a:rPr lang="en-GB" sz="2400" dirty="0">
+                <a:solidFill>
+                  <a:srgbClr val="0070C0"/>
+                </a:solidFill>
+                <a:hlinkClick r:id="rId2"/>
+              </a:rPr>
+              <a:t>://zenodo.org/record/7728016#.ZCWRkXbMKUm</a:t>
+            </a:r>
+            <a:endParaRPr lang="en-GB" sz="2400" dirty="0">
               <a:solidFill>
                 <a:srgbClr val="0070C0"/>
               </a:solidFill>
@@ -6692,6 +6752,13 @@
   <p:clrMapOvr>
     <a:masterClrMapping/>
   </p:clrMapOvr>
+  <p:timing>
+    <p:tnLst>
+      <p:par>
+        <p:cTn id="1" dur="indefinite" restart="never" nodeType="tmRoot"/>
+      </p:par>
+    </p:tnLst>
+  </p:timing>
 </p:sld>
 </file>
 
@@ -8574,7 +8641,7 @@
         </p:nvSpPr>
         <p:spPr>
           <a:xfrm>
-            <a:off x="7523922" y="4444831"/>
+            <a:off x="7352472" y="4571050"/>
             <a:ext cx="6094324" cy="369332"/>
           </a:xfrm>
           <a:prstGeom prst="rect">
@@ -9118,7 +9185,7 @@
                 <a14:useLocalDpi xmlns:a14="http://schemas.microsoft.com/office/drawing/2010/main" val="0"/>
               </a:ext>
               <a:ext uri="{96DAC541-7B7A-43D3-8B79-37D633B846F1}">
-                <asvg:svgBlip xmlns="" xmlns:asvg="http://schemas.microsoft.com/office/drawing/2016/SVG/main" r:embed="rId3"/>
+                <asvg:svgBlip xmlns:asvg="http://schemas.microsoft.com/office/drawing/2016/SVG/main" xmlns="" r:embed="rId3"/>
               </a:ext>
             </a:extLst>
           </a:blip>
@@ -9157,7 +9224,7 @@
                 <a14:useLocalDpi xmlns:a14="http://schemas.microsoft.com/office/drawing/2010/main" val="0"/>
               </a:ext>
               <a:ext uri="{96DAC541-7B7A-43D3-8B79-37D633B846F1}">
-                <asvg:svgBlip xmlns="" xmlns:asvg="http://schemas.microsoft.com/office/drawing/2016/SVG/main" r:embed="rId5"/>
+                <asvg:svgBlip xmlns:asvg="http://schemas.microsoft.com/office/drawing/2016/SVG/main" xmlns="" r:embed="rId5"/>
               </a:ext>
             </a:extLst>
           </a:blip>
@@ -9196,7 +9263,7 @@
                 <a14:useLocalDpi xmlns:a14="http://schemas.microsoft.com/office/drawing/2010/main" val="0"/>
               </a:ext>
               <a:ext uri="{96DAC541-7B7A-43D3-8B79-37D633B846F1}">
-                <asvg:svgBlip xmlns="" xmlns:asvg="http://schemas.microsoft.com/office/drawing/2016/SVG/main" r:embed="rId7"/>
+                <asvg:svgBlip xmlns:asvg="http://schemas.microsoft.com/office/drawing/2016/SVG/main" xmlns="" r:embed="rId7"/>
               </a:ext>
             </a:extLst>
           </a:blip>
@@ -9224,6 +9291,13 @@
   <p:clrMapOvr>
     <a:masterClrMapping/>
   </p:clrMapOvr>
+  <p:timing>
+    <p:tnLst>
+      <p:par>
+        <p:cTn id="1" dur="indefinite" restart="never" nodeType="tmRoot"/>
+      </p:par>
+    </p:tnLst>
+  </p:timing>
 </p:sld>
 </file>
 
@@ -9326,6 +9400,13 @@
   <p:clrMapOvr>
     <a:masterClrMapping/>
   </p:clrMapOvr>
+  <p:timing>
+    <p:tnLst>
+      <p:par>
+        <p:cTn id="1" dur="indefinite" restart="never" nodeType="tmRoot"/>
+      </p:par>
+    </p:tnLst>
+  </p:timing>
 </p:sld>
 </file>
 
@@ -9402,7 +9483,7 @@
         <p:spPr>
           <a:xfrm>
             <a:off x="624689" y="1774196"/>
-            <a:ext cx="10601608" cy="2943563"/>
+            <a:ext cx="10601608" cy="3046988"/>
           </a:xfrm>
           <a:prstGeom prst="rect">
             <a:avLst/>
@@ -9845,6 +9926,13 @@
   <p:clrMapOvr>
     <a:masterClrMapping/>
   </p:clrMapOvr>
+  <p:timing>
+    <p:tnLst>
+      <p:par>
+        <p:cTn id="1" dur="indefinite" restart="never" nodeType="tmRoot"/>
+      </p:par>
+    </p:tnLst>
+  </p:timing>
 </p:sld>
 </file>
 
@@ -10377,6 +10465,13 @@
   <p:clrMapOvr>
     <a:masterClrMapping/>
   </p:clrMapOvr>
+  <p:timing>
+    <p:tnLst>
+      <p:par>
+        <p:cTn id="1" dur="indefinite" restart="never" nodeType="tmRoot"/>
+      </p:par>
+    </p:tnLst>
+  </p:timing>
 </p:sld>
 </file>
 

</xml_diff>